<commit_message>
Made slight changes to powerpoint
</commit_message>
<xml_diff>
--- a/Kitsune Prototype Powerpoint.pptx
+++ b/Kitsune Prototype Powerpoint.pptx
@@ -26498,15 +26498,6 @@
 </file>
 
 <file path=customXml/item2.xml><?xml version="1.0" encoding="utf-8"?>
-<?mso-contentType ?>
-<FormTemplates xmlns="http://schemas.microsoft.com/sharepoint/v3/contenttype/forms">
-  <Display>DocumentLibraryForm</Display>
-  <Edit>DocumentLibraryForm</Edit>
-  <New>DocumentLibraryForm</New>
-</FormTemplates>
-</file>
-
-<file path=customXml/item3.xml><?xml version="1.0" encoding="utf-8"?>
 <ct:contentTypeSchema xmlns:ct="http://schemas.microsoft.com/office/2006/metadata/contentType" xmlns:ma="http://schemas.microsoft.com/office/2006/metadata/properties/metaAttributes" ct:_="" ma:_="" ma:contentTypeName="Document" ma:contentTypeID="0x010100DEEA25CC0A0AC24199CDC46C25B8B0BC" ma:contentTypeVersion="10" ma:contentTypeDescription="Create a new document." ma:contentTypeScope="" ma:versionID="e3b47856d4cf355c0dacb39e1084d14f">
   <xsd:schema xmlns:xsd="http://www.w3.org/2001/XMLSchema" xmlns:xs="http://www.w3.org/2001/XMLSchema" xmlns:p="http://schemas.microsoft.com/office/2006/metadata/properties" xmlns:ns1="http://schemas.microsoft.com/sharepoint/v3" xmlns:ns2="6dc4bcd6-49db-4c07-9060-8acfc67cef9f" xmlns:ns3="fb0879af-3eba-417a-a55a-ffe6dcd6ca77" targetNamespace="http://schemas.microsoft.com/office/2006/metadata/properties" ma:root="true" ma:fieldsID="a845a615265fdb1f7b12cc65ac20ecbd" ns1:_="" ns2:_="" ns3:_="">
     <xsd:import namespace="http://schemas.microsoft.com/sharepoint/v3"/>
@@ -26714,18 +26705,27 @@
 </ct:contentTypeSchema>
 </file>
 
+<file path=customXml/item3.xml><?xml version="1.0" encoding="utf-8"?>
+<?mso-contentType ?>
+<FormTemplates xmlns="http://schemas.microsoft.com/sharepoint/v3/contenttype/forms">
+  <Display>DocumentLibraryForm</Display>
+  <Edit>DocumentLibraryForm</Edit>
+  <New>DocumentLibraryForm</New>
+</FormTemplates>
+</file>
+
 <file path=customXml/itemProps1.xml><?xml version="1.0" encoding="utf-8"?>
 <ds:datastoreItem xmlns:ds="http://schemas.openxmlformats.org/officeDocument/2006/customXml" ds:itemID="{F8992231-163D-4428-A2B8-DA1FE0274129}">
   <ds:schemaRefs>
-    <ds:schemaRef ds:uri="fb0879af-3eba-417a-a55a-ffe6dcd6ca77"/>
-    <ds:schemaRef ds:uri="http://schemas.microsoft.com/office/2006/metadata/properties"/>
     <ds:schemaRef ds:uri="http://purl.org/dc/elements/1.1/"/>
     <ds:schemaRef ds:uri="http://schemas.microsoft.com/sharepoint/v3"/>
     <ds:schemaRef ds:uri="http://schemas.openxmlformats.org/package/2006/metadata/core-properties"/>
+    <ds:schemaRef ds:uri="6dc4bcd6-49db-4c07-9060-8acfc67cef9f"/>
     <ds:schemaRef ds:uri="http://purl.org/dc/terms/"/>
     <ds:schemaRef ds:uri="http://schemas.microsoft.com/office/infopath/2007/PartnerControls"/>
     <ds:schemaRef ds:uri="http://schemas.microsoft.com/office/2006/documentManagement/types"/>
-    <ds:schemaRef ds:uri="6dc4bcd6-49db-4c07-9060-8acfc67cef9f"/>
+    <ds:schemaRef ds:uri="http://schemas.microsoft.com/office/2006/metadata/properties"/>
+    <ds:schemaRef ds:uri="fb0879af-3eba-417a-a55a-ffe6dcd6ca77"/>
     <ds:schemaRef ds:uri="http://www.w3.org/XML/1998/namespace"/>
     <ds:schemaRef ds:uri="http://purl.org/dc/dcmitype/"/>
   </ds:schemaRefs>
@@ -26733,14 +26733,6 @@
 </file>
 
 <file path=customXml/itemProps2.xml><?xml version="1.0" encoding="utf-8"?>
-<ds:datastoreItem xmlns:ds="http://schemas.openxmlformats.org/officeDocument/2006/customXml" ds:itemID="{8A95DE24-D6C3-4A00-9085-D9594C193AE1}">
-  <ds:schemaRefs>
-    <ds:schemaRef ds:uri="http://schemas.microsoft.com/sharepoint/v3/contenttype/forms"/>
-  </ds:schemaRefs>
-</ds:datastoreItem>
-</file>
-
-<file path=customXml/itemProps3.xml><?xml version="1.0" encoding="utf-8"?>
 <ds:datastoreItem xmlns:ds="http://schemas.openxmlformats.org/officeDocument/2006/customXml" ds:itemID="{6B67ACAB-C3DC-429D-A23C-0723C084FEE5}">
   <ds:schemaRefs>
     <ds:schemaRef ds:uri="http://schemas.microsoft.com/office/2006/metadata/contentType"/>
@@ -26758,4 +26750,12 @@
     <ds:schemaRef ds:uri="http://schemas.microsoft.com/internal/obd"/>
   </ds:schemaRefs>
 </ds:datastoreItem>
+</file>
+
+<file path=customXml/itemProps3.xml><?xml version="1.0" encoding="utf-8"?>
+<ds:datastoreItem xmlns:ds="http://schemas.openxmlformats.org/officeDocument/2006/customXml" ds:itemID="{8A95DE24-D6C3-4A00-9085-D9594C193AE1}">
+  <ds:schemaRefs>
+    <ds:schemaRef ds:uri="http://schemas.microsoft.com/sharepoint/v3/contenttype/forms"/>
+  </ds:schemaRefs>
+</ds:datastoreItem>
 </file>
</xml_diff>

<commit_message>
Enemy now falls if hit with teleporation shuriken and Powerpoint update
</commit_message>
<xml_diff>
--- a/Kitsune Prototype Powerpoint.pptx
+++ b/Kitsune Prototype Powerpoint.pptx
@@ -5,21 +5,19 @@
     <p:sldMasterId id="2147483648" r:id="rId4"/>
   </p:sldMasterIdLst>
   <p:notesMasterIdLst>
-    <p:notesMasterId r:id="rId14"/>
+    <p:notesMasterId r:id="rId12"/>
   </p:notesMasterIdLst>
   <p:handoutMasterIdLst>
-    <p:handoutMasterId r:id="rId15"/>
+    <p:handoutMasterId r:id="rId13"/>
   </p:handoutMasterIdLst>
   <p:sldIdLst>
     <p:sldId id="256" r:id="rId5"/>
-    <p:sldId id="257" r:id="rId6"/>
+    <p:sldId id="292" r:id="rId6"/>
     <p:sldId id="258" r:id="rId7"/>
-    <p:sldId id="260" r:id="rId8"/>
-    <p:sldId id="289" r:id="rId9"/>
-    <p:sldId id="290" r:id="rId10"/>
-    <p:sldId id="291" r:id="rId11"/>
-    <p:sldId id="269" r:id="rId12"/>
-    <p:sldId id="268" r:id="rId13"/>
+    <p:sldId id="289" r:id="rId8"/>
+    <p:sldId id="291" r:id="rId9"/>
+    <p:sldId id="269" r:id="rId10"/>
+    <p:sldId id="268" r:id="rId11"/>
   </p:sldIdLst>
   <p:sldSz cx="12192000" cy="6858000"/>
   <p:notesSz cx="6858000" cy="9144000"/>
@@ -24356,10 +24354,10 @@
       </p:grpSpPr>
       <p:sp>
         <p:nvSpPr>
-          <p:cNvPr id="4" name="Title 3">
+          <p:cNvPr id="16" name="Title 15">
             <a:extLst>
               <a:ext uri="{FF2B5EF4-FFF2-40B4-BE49-F238E27FC236}">
-                <a16:creationId xmlns:a16="http://schemas.microsoft.com/office/drawing/2014/main" id="{E3BD8413-C238-49D7-A4E1-E8FEF1811A0E}"/>
+                <a16:creationId xmlns:a16="http://schemas.microsoft.com/office/drawing/2014/main" id="{E0AA3CC6-7F34-48B6-9B4E-EE11F76969E0}"/>
               </a:ext>
             </a:extLst>
           </p:cNvPr>
@@ -24370,67 +24368,28 @@
             <p:ph type="title"/>
           </p:nvPr>
         </p:nvSpPr>
-        <p:spPr>
-          <a:xfrm>
-            <a:off x="0" y="0"/>
-            <a:ext cx="12192000" cy="6858000"/>
-          </a:xfrm>
-        </p:spPr>
+        <p:spPr/>
         <p:txBody>
           <a:bodyPr/>
           <a:lstStyle/>
           <a:p>
-            <a:pPr algn="ctr"/>
             <a:r>
-              <a:rPr lang="en-US" sz="9600" dirty="0">
-                <a:solidFill>
-                  <a:schemeClr val="accent6"/>
-                </a:solidFill>
-              </a:rPr>
-              <a:t>Lore</a:t>
-            </a:r>
-            <a:br>
               <a:rPr lang="en-US" dirty="0">
                 <a:solidFill>
                   <a:schemeClr val="accent6"/>
                 </a:solidFill>
               </a:rPr>
-            </a:br>
-            <a:br>
-              <a:rPr lang="en-US" dirty="0">
-                <a:solidFill>
-                  <a:schemeClr val="accent6"/>
-                </a:solidFill>
-              </a:rPr>
-            </a:br>
-            <a:br>
-              <a:rPr lang="en-US" dirty="0">
-                <a:solidFill>
-                  <a:schemeClr val="accent6"/>
-                </a:solidFill>
-              </a:rPr>
-            </a:br>
-            <a:br>
-              <a:rPr lang="en-US" dirty="0">
-                <a:solidFill>
-                  <a:schemeClr val="accent6"/>
-                </a:solidFill>
-              </a:rPr>
-            </a:br>
-            <a:endParaRPr lang="en-GB" dirty="0">
-              <a:solidFill>
-                <a:schemeClr val="accent6"/>
-              </a:solidFill>
-            </a:endParaRPr>
+              <a:t>The Team</a:t>
+            </a:r>
           </a:p>
         </p:txBody>
       </p:sp>
       <p:sp>
         <p:nvSpPr>
-          <p:cNvPr id="2" name="Slide Number Placeholder 1">
+          <p:cNvPr id="3" name="Slide Number Placeholder 2">
             <a:extLst>
               <a:ext uri="{FF2B5EF4-FFF2-40B4-BE49-F238E27FC236}">
-                <a16:creationId xmlns:a16="http://schemas.microsoft.com/office/drawing/2014/main" id="{0B24BF10-2B55-43AB-9F77-F1A1410384A9}"/>
+                <a16:creationId xmlns:a16="http://schemas.microsoft.com/office/drawing/2014/main" id="{4AB3FDB8-90ED-4EA3-B142-1322C53D6E94}"/>
               </a:ext>
             </a:extLst>
           </p:cNvPr>
@@ -24455,28 +24414,340 @@
           </a:p>
         </p:txBody>
       </p:sp>
+      <p:sp>
+        <p:nvSpPr>
+          <p:cNvPr id="18" name="Text Placeholder 9">
+            <a:extLst>
+              <a:ext uri="{FF2B5EF4-FFF2-40B4-BE49-F238E27FC236}">
+                <a16:creationId xmlns:a16="http://schemas.microsoft.com/office/drawing/2014/main" id="{A8E2E993-BFC9-406E-A8A0-F0991E2B8256}"/>
+              </a:ext>
+            </a:extLst>
+          </p:cNvPr>
+          <p:cNvSpPr txBox="1">
+            <a:spLocks/>
+          </p:cNvSpPr>
+          <p:nvPr/>
+        </p:nvSpPr>
+        <p:spPr>
+          <a:xfrm>
+            <a:off x="444499" y="1625385"/>
+            <a:ext cx="8875821" cy="4093243"/>
+          </a:xfrm>
+          <a:prstGeom prst="rect">
+            <a:avLst/>
+          </a:prstGeom>
+        </p:spPr>
+        <p:txBody>
+          <a:bodyPr/>
+          <a:lstStyle>
+            <a:lvl1pPr marL="228600" indent="-228600" algn="l" defTabSz="914400" rtl="0" eaLnBrk="1" latinLnBrk="0" hangingPunct="1">
+              <a:lnSpc>
+                <a:spcPct val="90000"/>
+              </a:lnSpc>
+              <a:spcBef>
+                <a:spcPts val="1000"/>
+              </a:spcBef>
+              <a:buClr>
+                <a:schemeClr val="accent2"/>
+              </a:buClr>
+              <a:buFont typeface="Arial" panose="020B0604020202020204" pitchFamily="34" charset="0"/>
+              <a:buChar char="•"/>
+              <a:defRPr sz="2800" kern="1200">
+                <a:solidFill>
+                  <a:schemeClr val="tx1"/>
+                </a:solidFill>
+                <a:latin typeface="+mn-lt"/>
+                <a:ea typeface="+mn-ea"/>
+                <a:cs typeface="+mn-cs"/>
+              </a:defRPr>
+            </a:lvl1pPr>
+            <a:lvl2pPr marL="685800" indent="-228600" algn="l" defTabSz="914400" rtl="0" eaLnBrk="1" latinLnBrk="0" hangingPunct="1">
+              <a:lnSpc>
+                <a:spcPct val="90000"/>
+              </a:lnSpc>
+              <a:spcBef>
+                <a:spcPts val="500"/>
+              </a:spcBef>
+              <a:buClr>
+                <a:schemeClr val="accent2"/>
+              </a:buClr>
+              <a:buFont typeface="Arial" panose="020B0604020202020204" pitchFamily="34" charset="0"/>
+              <a:buChar char="•"/>
+              <a:defRPr sz="2400" kern="1200">
+                <a:solidFill>
+                  <a:schemeClr val="tx1"/>
+                </a:solidFill>
+                <a:latin typeface="+mn-lt"/>
+                <a:ea typeface="+mn-ea"/>
+                <a:cs typeface="+mn-cs"/>
+              </a:defRPr>
+            </a:lvl2pPr>
+            <a:lvl3pPr marL="1143000" indent="-228600" algn="l" defTabSz="914400" rtl="0" eaLnBrk="1" latinLnBrk="0" hangingPunct="1">
+              <a:lnSpc>
+                <a:spcPct val="90000"/>
+              </a:lnSpc>
+              <a:spcBef>
+                <a:spcPts val="500"/>
+              </a:spcBef>
+              <a:buClr>
+                <a:schemeClr val="accent2"/>
+              </a:buClr>
+              <a:buFont typeface="Arial" panose="020B0604020202020204" pitchFamily="34" charset="0"/>
+              <a:buChar char="•"/>
+              <a:defRPr sz="2000" kern="1200">
+                <a:solidFill>
+                  <a:schemeClr val="tx1"/>
+                </a:solidFill>
+                <a:latin typeface="+mn-lt"/>
+                <a:ea typeface="+mn-ea"/>
+                <a:cs typeface="+mn-cs"/>
+              </a:defRPr>
+            </a:lvl3pPr>
+            <a:lvl4pPr marL="1600200" indent="-228600" algn="l" defTabSz="914400" rtl="0" eaLnBrk="1" latinLnBrk="0" hangingPunct="1">
+              <a:lnSpc>
+                <a:spcPct val="90000"/>
+              </a:lnSpc>
+              <a:spcBef>
+                <a:spcPts val="500"/>
+              </a:spcBef>
+              <a:buClr>
+                <a:schemeClr val="accent2"/>
+              </a:buClr>
+              <a:buFont typeface="Arial" panose="020B0604020202020204" pitchFamily="34" charset="0"/>
+              <a:buChar char="•"/>
+              <a:defRPr sz="1800" kern="1200">
+                <a:solidFill>
+                  <a:schemeClr val="tx1"/>
+                </a:solidFill>
+                <a:latin typeface="+mn-lt"/>
+                <a:ea typeface="+mn-ea"/>
+                <a:cs typeface="+mn-cs"/>
+              </a:defRPr>
+            </a:lvl4pPr>
+            <a:lvl5pPr marL="2057400" indent="-228600" algn="l" defTabSz="914400" rtl="0" eaLnBrk="1" latinLnBrk="0" hangingPunct="1">
+              <a:lnSpc>
+                <a:spcPct val="90000"/>
+              </a:lnSpc>
+              <a:spcBef>
+                <a:spcPts val="500"/>
+              </a:spcBef>
+              <a:buClr>
+                <a:schemeClr val="accent2"/>
+              </a:buClr>
+              <a:buFont typeface="Arial" panose="020B0604020202020204" pitchFamily="34" charset="0"/>
+              <a:buChar char="•"/>
+              <a:defRPr sz="1800" kern="1200">
+                <a:solidFill>
+                  <a:schemeClr val="tx1"/>
+                </a:solidFill>
+                <a:latin typeface="+mn-lt"/>
+                <a:ea typeface="+mn-ea"/>
+                <a:cs typeface="+mn-cs"/>
+              </a:defRPr>
+            </a:lvl5pPr>
+            <a:lvl6pPr marL="2514600" indent="-228600" algn="l" defTabSz="914400" rtl="0" eaLnBrk="1" latinLnBrk="0" hangingPunct="1">
+              <a:lnSpc>
+                <a:spcPct val="90000"/>
+              </a:lnSpc>
+              <a:spcBef>
+                <a:spcPts val="500"/>
+              </a:spcBef>
+              <a:buFont typeface="Arial" panose="020B0604020202020204" pitchFamily="34" charset="0"/>
+              <a:buChar char="•"/>
+              <a:defRPr sz="1800" kern="1200">
+                <a:solidFill>
+                  <a:schemeClr val="tx1"/>
+                </a:solidFill>
+                <a:latin typeface="+mn-lt"/>
+                <a:ea typeface="+mn-ea"/>
+                <a:cs typeface="+mn-cs"/>
+              </a:defRPr>
+            </a:lvl6pPr>
+            <a:lvl7pPr marL="2971800" indent="-228600" algn="l" defTabSz="914400" rtl="0" eaLnBrk="1" latinLnBrk="0" hangingPunct="1">
+              <a:lnSpc>
+                <a:spcPct val="90000"/>
+              </a:lnSpc>
+              <a:spcBef>
+                <a:spcPts val="500"/>
+              </a:spcBef>
+              <a:buFont typeface="Arial" panose="020B0604020202020204" pitchFamily="34" charset="0"/>
+              <a:buChar char="•"/>
+              <a:defRPr sz="1800" kern="1200">
+                <a:solidFill>
+                  <a:schemeClr val="tx1"/>
+                </a:solidFill>
+                <a:latin typeface="+mn-lt"/>
+                <a:ea typeface="+mn-ea"/>
+                <a:cs typeface="+mn-cs"/>
+              </a:defRPr>
+            </a:lvl7pPr>
+            <a:lvl8pPr marL="3429000" indent="-228600" algn="l" defTabSz="914400" rtl="0" eaLnBrk="1" latinLnBrk="0" hangingPunct="1">
+              <a:lnSpc>
+                <a:spcPct val="90000"/>
+              </a:lnSpc>
+              <a:spcBef>
+                <a:spcPts val="500"/>
+              </a:spcBef>
+              <a:buFont typeface="Arial" panose="020B0604020202020204" pitchFamily="34" charset="0"/>
+              <a:buChar char="•"/>
+              <a:defRPr sz="1800" kern="1200">
+                <a:solidFill>
+                  <a:schemeClr val="tx1"/>
+                </a:solidFill>
+                <a:latin typeface="+mn-lt"/>
+                <a:ea typeface="+mn-ea"/>
+                <a:cs typeface="+mn-cs"/>
+              </a:defRPr>
+            </a:lvl8pPr>
+            <a:lvl9pPr marL="3886200" indent="-228600" algn="l" defTabSz="914400" rtl="0" eaLnBrk="1" latinLnBrk="0" hangingPunct="1">
+              <a:lnSpc>
+                <a:spcPct val="90000"/>
+              </a:lnSpc>
+              <a:spcBef>
+                <a:spcPts val="500"/>
+              </a:spcBef>
+              <a:buFont typeface="Arial" panose="020B0604020202020204" pitchFamily="34" charset="0"/>
+              <a:buChar char="•"/>
+              <a:defRPr sz="1800" kern="1200">
+                <a:solidFill>
+                  <a:schemeClr val="tx1"/>
+                </a:solidFill>
+                <a:latin typeface="+mn-lt"/>
+                <a:ea typeface="+mn-ea"/>
+                <a:cs typeface="+mn-cs"/>
+              </a:defRPr>
+            </a:lvl9pPr>
+          </a:lstStyle>
+          <a:p>
+            <a:pPr>
+              <a:buClr>
+                <a:schemeClr val="accent6"/>
+              </a:buClr>
+              <a:buFont typeface="Wingdings" panose="05000000000000000000" pitchFamily="2" charset="2"/>
+              <a:buChar char="v"/>
+            </a:pPr>
+            <a:r>
+              <a:rPr lang="en-US" sz="3200" dirty="0">
+                <a:solidFill>
+                  <a:schemeClr val="accent6"/>
+                </a:solidFill>
+              </a:rPr>
+              <a:t>Matthew Berrios – Programmer </a:t>
+            </a:r>
+          </a:p>
+          <a:p>
+            <a:pPr>
+              <a:buClr>
+                <a:schemeClr val="accent6"/>
+              </a:buClr>
+              <a:buFont typeface="Wingdings" panose="05000000000000000000" pitchFamily="2" charset="2"/>
+              <a:buChar char="v"/>
+            </a:pPr>
+            <a:r>
+              <a:rPr lang="en-US" sz="3200" dirty="0">
+                <a:solidFill>
+                  <a:schemeClr val="accent6"/>
+                </a:solidFill>
+              </a:rPr>
+              <a:t>Maddie Powers Johnson – Programmer </a:t>
+            </a:r>
+          </a:p>
+          <a:p>
+            <a:pPr>
+              <a:buClr>
+                <a:schemeClr val="accent6"/>
+              </a:buClr>
+              <a:buFont typeface="Wingdings" panose="05000000000000000000" pitchFamily="2" charset="2"/>
+              <a:buChar char="v"/>
+            </a:pPr>
+            <a:r>
+              <a:rPr lang="en-US" sz="3200" dirty="0">
+                <a:solidFill>
+                  <a:schemeClr val="accent6"/>
+                </a:solidFill>
+              </a:rPr>
+              <a:t>Johnson Nguyen – Sound Design</a:t>
+            </a:r>
+          </a:p>
+          <a:p>
+            <a:pPr>
+              <a:buClr>
+                <a:schemeClr val="accent6"/>
+              </a:buClr>
+              <a:buFont typeface="Wingdings" panose="05000000000000000000" pitchFamily="2" charset="2"/>
+              <a:buChar char="v"/>
+            </a:pPr>
+            <a:r>
+              <a:rPr lang="en-US" sz="3200" dirty="0">
+                <a:solidFill>
+                  <a:schemeClr val="accent6"/>
+                </a:solidFill>
+              </a:rPr>
+              <a:t>Kenny Nguyen – Programmer </a:t>
+            </a:r>
+          </a:p>
+          <a:p>
+            <a:pPr>
+              <a:buClr>
+                <a:schemeClr val="accent6"/>
+              </a:buClr>
+              <a:buFont typeface="Wingdings" panose="05000000000000000000" pitchFamily="2" charset="2"/>
+              <a:buChar char="v"/>
+            </a:pPr>
+            <a:r>
+              <a:rPr lang="en-US" sz="3200" dirty="0">
+                <a:solidFill>
+                  <a:schemeClr val="accent6"/>
+                </a:solidFill>
+              </a:rPr>
+              <a:t>Chloe </a:t>
+            </a:r>
+            <a:r>
+              <a:rPr lang="en-US" sz="3200" dirty="0" err="1">
+                <a:solidFill>
+                  <a:schemeClr val="accent6"/>
+                </a:solidFill>
+              </a:rPr>
+              <a:t>Pitko</a:t>
+            </a:r>
+            <a:r>
+              <a:rPr lang="en-US" sz="3200" dirty="0">
+                <a:solidFill>
+                  <a:schemeClr val="accent6"/>
+                </a:solidFill>
+              </a:rPr>
+              <a:t> – Artist </a:t>
+            </a:r>
+          </a:p>
+          <a:p>
+            <a:pPr>
+              <a:buClr>
+                <a:schemeClr val="accent6"/>
+              </a:buClr>
+              <a:buFont typeface="Wingdings" panose="05000000000000000000" pitchFamily="2" charset="2"/>
+              <a:buChar char="v"/>
+            </a:pPr>
+            <a:r>
+              <a:rPr lang="en-US" sz="3200" dirty="0">
+                <a:solidFill>
+                  <a:schemeClr val="accent6"/>
+                </a:solidFill>
+              </a:rPr>
+              <a:t>Marcus Chiu – Programmer </a:t>
+            </a:r>
+          </a:p>
+        </p:txBody>
+      </p:sp>
     </p:spTree>
     <p:extLst>
       <p:ext uri="{BB962C8B-B14F-4D97-AF65-F5344CB8AC3E}">
-        <p14:creationId xmlns:p14="http://schemas.microsoft.com/office/powerpoint/2010/main" val="2902794312"/>
+        <p14:creationId xmlns:p14="http://schemas.microsoft.com/office/powerpoint/2010/main" val="4029470092"/>
       </p:ext>
     </p:extLst>
   </p:cSld>
   <p:clrMapOvr>
     <a:masterClrMapping/>
   </p:clrMapOvr>
-  <mc:AlternateContent xmlns:mc="http://schemas.openxmlformats.org/markup-compatibility/2006" xmlns:p14="http://schemas.microsoft.com/office/powerpoint/2010/main">
-    <mc:Choice Requires="p14">
-      <p:transition spd="med" p14:dur="700">
-        <p:fade/>
-      </p:transition>
-    </mc:Choice>
-    <mc:Fallback xmlns="">
-      <p:transition spd="med">
-        <p:fade/>
-      </p:transition>
-    </mc:Fallback>
-  </mc:AlternateContent>
 </p:sld>
 </file>
 
@@ -24719,149 +24990,6 @@
           <p:cNvPr id="4" name="Title 3">
             <a:extLst>
               <a:ext uri="{FF2B5EF4-FFF2-40B4-BE49-F238E27FC236}">
-                <a16:creationId xmlns:a16="http://schemas.microsoft.com/office/drawing/2014/main" id="{BD179B88-D43C-4A31-9A52-3498E9430782}"/>
-              </a:ext>
-            </a:extLst>
-          </p:cNvPr>
-          <p:cNvSpPr>
-            <a:spLocks noGrp="1"/>
-          </p:cNvSpPr>
-          <p:nvPr>
-            <p:ph type="title"/>
-          </p:nvPr>
-        </p:nvSpPr>
-        <p:spPr>
-          <a:xfrm>
-            <a:off x="0" y="0"/>
-            <a:ext cx="12192000" cy="6858000"/>
-          </a:xfrm>
-        </p:spPr>
-        <p:txBody>
-          <a:bodyPr/>
-          <a:lstStyle/>
-          <a:p>
-            <a:pPr algn="ctr"/>
-            <a:r>
-              <a:rPr lang="en-GB" sz="7200" dirty="0">
-                <a:solidFill>
-                  <a:schemeClr val="accent6"/>
-                </a:solidFill>
-              </a:rPr>
-              <a:t>Mechanics</a:t>
-            </a:r>
-            <a:br>
-              <a:rPr lang="en-GB" dirty="0">
-                <a:solidFill>
-                  <a:schemeClr val="accent6"/>
-                </a:solidFill>
-              </a:rPr>
-            </a:br>
-            <a:br>
-              <a:rPr lang="en-GB" dirty="0">
-                <a:solidFill>
-                  <a:schemeClr val="accent6"/>
-                </a:solidFill>
-              </a:rPr>
-            </a:br>
-            <a:br>
-              <a:rPr lang="en-GB" dirty="0">
-                <a:solidFill>
-                  <a:schemeClr val="accent6"/>
-                </a:solidFill>
-              </a:rPr>
-            </a:br>
-            <a:br>
-              <a:rPr lang="en-GB" dirty="0">
-                <a:solidFill>
-                  <a:schemeClr val="accent6"/>
-                </a:solidFill>
-              </a:rPr>
-            </a:br>
-            <a:endParaRPr lang="en-GB" dirty="0">
-              <a:solidFill>
-                <a:schemeClr val="accent6"/>
-              </a:solidFill>
-            </a:endParaRPr>
-          </a:p>
-        </p:txBody>
-      </p:sp>
-      <p:sp>
-        <p:nvSpPr>
-          <p:cNvPr id="2" name="Slide Number Placeholder 1">
-            <a:extLst>
-              <a:ext uri="{FF2B5EF4-FFF2-40B4-BE49-F238E27FC236}">
-                <a16:creationId xmlns:a16="http://schemas.microsoft.com/office/drawing/2014/main" id="{8B065C75-272B-4BB5-BA23-D80E8654D621}"/>
-              </a:ext>
-            </a:extLst>
-          </p:cNvPr>
-          <p:cNvSpPr>
-            <a:spLocks noGrp="1"/>
-          </p:cNvSpPr>
-          <p:nvPr>
-            <p:ph type="sldNum" sz="quarter" idx="12"/>
-          </p:nvPr>
-        </p:nvSpPr>
-        <p:spPr/>
-        <p:txBody>
-          <a:bodyPr/>
-          <a:lstStyle/>
-          <a:p>
-            <a:fld id="{C263D6C4-4840-40CC-AC84-17E24B3B7BDE}" type="slidenum">
-              <a:rPr lang="en-GB" smtClean="0"/>
-              <a:pPr/>
-              <a:t>4</a:t>
-            </a:fld>
-            <a:endParaRPr lang="en-GB" dirty="0"/>
-          </a:p>
-        </p:txBody>
-      </p:sp>
-    </p:spTree>
-    <p:extLst>
-      <p:ext uri="{BB962C8B-B14F-4D97-AF65-F5344CB8AC3E}">
-        <p14:creationId xmlns:p14="http://schemas.microsoft.com/office/powerpoint/2010/main" val="709828751"/>
-      </p:ext>
-    </p:extLst>
-  </p:cSld>
-  <p:clrMapOvr>
-    <a:masterClrMapping/>
-  </p:clrMapOvr>
-  <mc:AlternateContent xmlns:mc="http://schemas.openxmlformats.org/markup-compatibility/2006" xmlns:p14="http://schemas.microsoft.com/office/powerpoint/2010/main">
-    <mc:Choice Requires="p14">
-      <p:transition spd="med" p14:dur="700">
-        <p:fade/>
-      </p:transition>
-    </mc:Choice>
-    <mc:Fallback xmlns="">
-      <p:transition spd="med">
-        <p:fade/>
-      </p:transition>
-    </mc:Fallback>
-  </mc:AlternateContent>
-</p:sld>
-</file>
-
-<file path=ppt/slides/slide5.xml><?xml version="1.0" encoding="utf-8"?>
-<p:sld xmlns:a="http://schemas.openxmlformats.org/drawingml/2006/main" xmlns:r="http://schemas.openxmlformats.org/officeDocument/2006/relationships" xmlns:p="http://schemas.openxmlformats.org/presentationml/2006/main">
-  <p:cSld>
-    <p:spTree>
-      <p:nvGrpSpPr>
-        <p:cNvPr id="1" name=""/>
-        <p:cNvGrpSpPr/>
-        <p:nvPr/>
-      </p:nvGrpSpPr>
-      <p:grpSpPr>
-        <a:xfrm>
-          <a:off x="0" y="0"/>
-          <a:ext cx="0" cy="0"/>
-          <a:chOff x="0" y="0"/>
-          <a:chExt cx="0" cy="0"/>
-        </a:xfrm>
-      </p:grpSpPr>
-      <p:sp>
-        <p:nvSpPr>
-          <p:cNvPr id="4" name="Title 3">
-            <a:extLst>
-              <a:ext uri="{FF2B5EF4-FFF2-40B4-BE49-F238E27FC236}">
                 <a16:creationId xmlns:a16="http://schemas.microsoft.com/office/drawing/2014/main" id="{315E3981-F0D7-482C-A8E0-6A57700BECA7}"/>
               </a:ext>
             </a:extLst>
@@ -24913,7 +25041,7 @@
             <a:fld id="{C263D6C4-4840-40CC-AC84-17E24B3B7BDE}" type="slidenum">
               <a:rPr lang="en-GB" smtClean="0"/>
               <a:pPr/>
-              <a:t>5</a:t>
+              <a:t>4</a:t>
             </a:fld>
             <a:endParaRPr lang="en-GB" dirty="0"/>
           </a:p>
@@ -25283,136 +25411,7 @@
 </p:sld>
 </file>
 
-<file path=ppt/slides/slide6.xml><?xml version="1.0" encoding="utf-8"?>
-<p:sld xmlns:a="http://schemas.openxmlformats.org/drawingml/2006/main" xmlns:r="http://schemas.openxmlformats.org/officeDocument/2006/relationships" xmlns:p="http://schemas.openxmlformats.org/presentationml/2006/main">
-  <p:cSld>
-    <p:spTree>
-      <p:nvGrpSpPr>
-        <p:cNvPr id="1" name=""/>
-        <p:cNvGrpSpPr/>
-        <p:nvPr/>
-      </p:nvGrpSpPr>
-      <p:grpSpPr>
-        <a:xfrm>
-          <a:off x="0" y="0"/>
-          <a:ext cx="0" cy="0"/>
-          <a:chOff x="0" y="0"/>
-          <a:chExt cx="0" cy="0"/>
-        </a:xfrm>
-      </p:grpSpPr>
-      <p:sp>
-        <p:nvSpPr>
-          <p:cNvPr id="4" name="Title 3">
-            <a:extLst>
-              <a:ext uri="{FF2B5EF4-FFF2-40B4-BE49-F238E27FC236}">
-                <a16:creationId xmlns:a16="http://schemas.microsoft.com/office/drawing/2014/main" id="{315E3981-F0D7-482C-A8E0-6A57700BECA7}"/>
-              </a:ext>
-            </a:extLst>
-          </p:cNvPr>
-          <p:cNvSpPr>
-            <a:spLocks noGrp="1"/>
-          </p:cNvSpPr>
-          <p:nvPr>
-            <p:ph type="title"/>
-          </p:nvPr>
-        </p:nvSpPr>
-        <p:spPr>
-          <a:xfrm>
-            <a:off x="0" y="0"/>
-            <a:ext cx="12192000" cy="4191917"/>
-          </a:xfrm>
-        </p:spPr>
-        <p:txBody>
-          <a:bodyPr/>
-          <a:lstStyle/>
-          <a:p>
-            <a:pPr algn="ctr"/>
-            <a:br>
-              <a:rPr lang="en-GB" dirty="0">
-                <a:solidFill>
-                  <a:schemeClr val="accent6"/>
-                </a:solidFill>
-              </a:rPr>
-            </a:br>
-            <a:br>
-              <a:rPr lang="en-GB" dirty="0">
-                <a:solidFill>
-                  <a:schemeClr val="accent6"/>
-                </a:solidFill>
-              </a:rPr>
-            </a:br>
-            <a:br>
-              <a:rPr lang="en-GB" dirty="0">
-                <a:solidFill>
-                  <a:schemeClr val="accent6"/>
-                </a:solidFill>
-              </a:rPr>
-            </a:br>
-            <a:br>
-              <a:rPr lang="en-GB" dirty="0">
-                <a:solidFill>
-                  <a:schemeClr val="accent6"/>
-                </a:solidFill>
-              </a:rPr>
-            </a:br>
-            <a:br>
-              <a:rPr lang="en-GB" dirty="0">
-                <a:solidFill>
-                  <a:schemeClr val="accent6"/>
-                </a:solidFill>
-              </a:rPr>
-            </a:br>
-            <a:br>
-              <a:rPr lang="en-GB" dirty="0">
-                <a:solidFill>
-                  <a:schemeClr val="accent6"/>
-                </a:solidFill>
-              </a:rPr>
-            </a:br>
-            <a:br>
-              <a:rPr lang="en-GB" dirty="0">
-                <a:solidFill>
-                  <a:schemeClr val="accent6"/>
-                </a:solidFill>
-              </a:rPr>
-            </a:br>
-            <a:r>
-              <a:rPr lang="en-GB" sz="7200" dirty="0">
-                <a:solidFill>
-                  <a:schemeClr val="accent6"/>
-                </a:solidFill>
-              </a:rPr>
-              <a:t>Concept Art</a:t>
-            </a:r>
-          </a:p>
-        </p:txBody>
-      </p:sp>
-    </p:spTree>
-    <p:extLst>
-      <p:ext uri="{BB962C8B-B14F-4D97-AF65-F5344CB8AC3E}">
-        <p14:creationId xmlns:p14="http://schemas.microsoft.com/office/powerpoint/2010/main" val="2698827441"/>
-      </p:ext>
-    </p:extLst>
-  </p:cSld>
-  <p:clrMapOvr>
-    <a:masterClrMapping/>
-  </p:clrMapOvr>
-  <mc:AlternateContent xmlns:mc="http://schemas.openxmlformats.org/markup-compatibility/2006" xmlns:p14="http://schemas.microsoft.com/office/powerpoint/2010/main">
-    <mc:Choice Requires="p14">
-      <p:transition spd="med" p14:dur="700">
-        <p:fade/>
-      </p:transition>
-    </mc:Choice>
-    <mc:Fallback xmlns="">
-      <p:transition spd="med">
-        <p:fade/>
-      </p:transition>
-    </mc:Fallback>
-  </mc:AlternateContent>
-</p:sld>
-</file>
-
-<file path=ppt/slides/slide7.xml><?xml version="1.0" encoding="utf-8"?>
+<file path=ppt/slides/slide5.xml><?xml version="1.0" encoding="utf-8"?>
 <p:sld xmlns:a="http://schemas.openxmlformats.org/drawingml/2006/main" xmlns:r="http://schemas.openxmlformats.org/officeDocument/2006/relationships" xmlns:p="http://schemas.openxmlformats.org/presentationml/2006/main">
   <p:cSld>
     <p:spTree>
@@ -25453,7 +25452,7 @@
             <a:fld id="{C263D6C4-4840-40CC-AC84-17E24B3B7BDE}" type="slidenum">
               <a:rPr lang="en-GB" smtClean="0"/>
               <a:pPr/>
-              <a:t>7</a:t>
+              <a:t>5</a:t>
             </a:fld>
             <a:endParaRPr lang="en-GB" dirty="0"/>
           </a:p>
@@ -25551,7 +25550,7 @@
 </p:sld>
 </file>
 
-<file path=ppt/slides/slide8.xml><?xml version="1.0" encoding="utf-8"?>
+<file path=ppt/slides/slide6.xml><?xml version="1.0" encoding="utf-8"?>
 <p:sld xmlns:a="http://schemas.openxmlformats.org/drawingml/2006/main" xmlns:r="http://schemas.openxmlformats.org/officeDocument/2006/relationships" xmlns:p="http://schemas.openxmlformats.org/presentationml/2006/main">
   <p:cSld>
     <p:spTree>
@@ -25627,7 +25626,7 @@
 </p:sld>
 </file>
 
-<file path=ppt/slides/slide9.xml><?xml version="1.0" encoding="utf-8"?>
+<file path=ppt/slides/slide7.xml><?xml version="1.0" encoding="utf-8"?>
 <p:sld xmlns:a="http://schemas.openxmlformats.org/drawingml/2006/main" xmlns:r="http://schemas.openxmlformats.org/officeDocument/2006/relationships" xmlns:p="http://schemas.openxmlformats.org/presentationml/2006/main">
   <p:cSld>
     <p:spTree>
@@ -26498,6 +26497,15 @@
 </file>
 
 <file path=customXml/item2.xml><?xml version="1.0" encoding="utf-8"?>
+<?mso-contentType ?>
+<FormTemplates xmlns="http://schemas.microsoft.com/sharepoint/v3/contenttype/forms">
+  <Display>DocumentLibraryForm</Display>
+  <Edit>DocumentLibraryForm</Edit>
+  <New>DocumentLibraryForm</New>
+</FormTemplates>
+</file>
+
+<file path=customXml/item3.xml><?xml version="1.0" encoding="utf-8"?>
 <ct:contentTypeSchema xmlns:ct="http://schemas.microsoft.com/office/2006/metadata/contentType" xmlns:ma="http://schemas.microsoft.com/office/2006/metadata/properties/metaAttributes" ct:_="" ma:_="" ma:contentTypeName="Document" ma:contentTypeID="0x010100DEEA25CC0A0AC24199CDC46C25B8B0BC" ma:contentTypeVersion="10" ma:contentTypeDescription="Create a new document." ma:contentTypeScope="" ma:versionID="e3b47856d4cf355c0dacb39e1084d14f">
   <xsd:schema xmlns:xsd="http://www.w3.org/2001/XMLSchema" xmlns:xs="http://www.w3.org/2001/XMLSchema" xmlns:p="http://schemas.microsoft.com/office/2006/metadata/properties" xmlns:ns1="http://schemas.microsoft.com/sharepoint/v3" xmlns:ns2="6dc4bcd6-49db-4c07-9060-8acfc67cef9f" xmlns:ns3="fb0879af-3eba-417a-a55a-ffe6dcd6ca77" targetNamespace="http://schemas.microsoft.com/office/2006/metadata/properties" ma:root="true" ma:fieldsID="a845a615265fdb1f7b12cc65ac20ecbd" ns1:_="" ns2:_="" ns3:_="">
     <xsd:import namespace="http://schemas.microsoft.com/sharepoint/v3"/>
@@ -26705,15 +26713,6 @@
 </ct:contentTypeSchema>
 </file>
 
-<file path=customXml/item3.xml><?xml version="1.0" encoding="utf-8"?>
-<?mso-contentType ?>
-<FormTemplates xmlns="http://schemas.microsoft.com/sharepoint/v3/contenttype/forms">
-  <Display>DocumentLibraryForm</Display>
-  <Edit>DocumentLibraryForm</Edit>
-  <New>DocumentLibraryForm</New>
-</FormTemplates>
-</file>
-
 <file path=customXml/itemProps1.xml><?xml version="1.0" encoding="utf-8"?>
 <ds:datastoreItem xmlns:ds="http://schemas.openxmlformats.org/officeDocument/2006/customXml" ds:itemID="{F8992231-163D-4428-A2B8-DA1FE0274129}">
   <ds:schemaRefs>
@@ -26733,6 +26732,14 @@
 </file>
 
 <file path=customXml/itemProps2.xml><?xml version="1.0" encoding="utf-8"?>
+<ds:datastoreItem xmlns:ds="http://schemas.openxmlformats.org/officeDocument/2006/customXml" ds:itemID="{8A95DE24-D6C3-4A00-9085-D9594C193AE1}">
+  <ds:schemaRefs>
+    <ds:schemaRef ds:uri="http://schemas.microsoft.com/sharepoint/v3/contenttype/forms"/>
+  </ds:schemaRefs>
+</ds:datastoreItem>
+</file>
+
+<file path=customXml/itemProps3.xml><?xml version="1.0" encoding="utf-8"?>
 <ds:datastoreItem xmlns:ds="http://schemas.openxmlformats.org/officeDocument/2006/customXml" ds:itemID="{6B67ACAB-C3DC-429D-A23C-0723C084FEE5}">
   <ds:schemaRefs>
     <ds:schemaRef ds:uri="http://schemas.microsoft.com/office/2006/metadata/contentType"/>
@@ -26750,12 +26757,4 @@
     <ds:schemaRef ds:uri="http://schemas.microsoft.com/internal/obd"/>
   </ds:schemaRefs>
 </ds:datastoreItem>
-</file>
-
-<file path=customXml/itemProps3.xml><?xml version="1.0" encoding="utf-8"?>
-<ds:datastoreItem xmlns:ds="http://schemas.openxmlformats.org/officeDocument/2006/customXml" ds:itemID="{8A95DE24-D6C3-4A00-9085-D9594C193AE1}">
-  <ds:schemaRefs>
-    <ds:schemaRef ds:uri="http://schemas.microsoft.com/sharepoint/v3/contenttype/forms"/>
-  </ds:schemaRefs>
-</ds:datastoreItem>
 </file>
</xml_diff>